<commit_message>
More work on powerpoint presentation
</commit_message>
<xml_diff>
--- a/Dustin/OriginalWork/CameraSystemPaper/Camera System Presentation (name TBD).pptx
+++ b/Dustin/OriginalWork/CameraSystemPaper/Camera System Presentation (name TBD).pptx
@@ -4,6 +4,9 @@
   <p:sldMasterIdLst>
     <p:sldMasterId id="2147483708" r:id="rId1"/>
   </p:sldMasterIdLst>
+  <p:handoutMasterIdLst>
+    <p:handoutMasterId r:id="rId18"/>
+  </p:handoutMasterIdLst>
   <p:sldIdLst>
     <p:sldId id="256" r:id="rId2"/>
     <p:sldId id="257" r:id="rId3"/>
@@ -122,6 +125,171 @@
 </p:presentation>
 </file>
 
+<file path=ppt/handoutMasters/handoutMaster1.xml><?xml version="1.0" encoding="utf-8"?>
+<p:handoutMaster xmlns:a="http://schemas.openxmlformats.org/drawingml/2006/main" xmlns:r="http://schemas.openxmlformats.org/officeDocument/2006/relationships" xmlns:p="http://schemas.openxmlformats.org/presentationml/2006/main">
+  <p:cSld>
+    <p:bg>
+      <p:bgRef idx="1001">
+        <a:schemeClr val="bg1"/>
+      </p:bgRef>
+    </p:bg>
+    <p:spTree>
+      <p:nvGrpSpPr>
+        <p:cNvPr id="1" name=""/>
+        <p:cNvGrpSpPr/>
+        <p:nvPr/>
+      </p:nvGrpSpPr>
+      <p:grpSpPr>
+        <a:xfrm>
+          <a:off x="0" y="0"/>
+          <a:ext cx="0" cy="0"/>
+          <a:chOff x="0" y="0"/>
+          <a:chExt cx="0" cy="0"/>
+        </a:xfrm>
+      </p:grpSpPr>
+      <p:sp>
+        <p:nvSpPr>
+          <p:cNvPr id="2" name="Header Placeholder 1"/>
+          <p:cNvSpPr>
+            <a:spLocks noGrp="1"/>
+          </p:cNvSpPr>
+          <p:nvPr>
+            <p:ph type="hdr" sz="quarter"/>
+          </p:nvPr>
+        </p:nvSpPr>
+        <p:spPr>
+          <a:xfrm>
+            <a:off x="0" y="0"/>
+            <a:ext cx="2971800" cy="457200"/>
+          </a:xfrm>
+          <a:prstGeom prst="rect">
+            <a:avLst/>
+          </a:prstGeom>
+        </p:spPr>
+        <p:txBody>
+          <a:bodyPr vert="horz" lIns="91440" tIns="45720" rIns="91440" bIns="45720" rtlCol="0"/>
+          <a:lstStyle>
+            <a:lvl1pPr algn="l">
+              <a:defRPr sz="1200"/>
+            </a:lvl1pPr>
+          </a:lstStyle>
+          <a:p>
+            <a:endParaRPr lang="en-US"/>
+          </a:p>
+        </p:txBody>
+      </p:sp>
+      <p:sp>
+        <p:nvSpPr>
+          <p:cNvPr id="3" name="Date Placeholder 2"/>
+          <p:cNvSpPr>
+            <a:spLocks noGrp="1"/>
+          </p:cNvSpPr>
+          <p:nvPr>
+            <p:ph type="dt" sz="quarter" idx="1"/>
+          </p:nvPr>
+        </p:nvSpPr>
+        <p:spPr>
+          <a:xfrm>
+            <a:off x="3884613" y="0"/>
+            <a:ext cx="2971800" cy="457200"/>
+          </a:xfrm>
+          <a:prstGeom prst="rect">
+            <a:avLst/>
+          </a:prstGeom>
+        </p:spPr>
+        <p:txBody>
+          <a:bodyPr vert="horz" lIns="91440" tIns="45720" rIns="91440" bIns="45720" rtlCol="0"/>
+          <a:lstStyle>
+            <a:lvl1pPr algn="r">
+              <a:defRPr sz="1200"/>
+            </a:lvl1pPr>
+          </a:lstStyle>
+          <a:p>
+            <a:fld id="{2A80186F-020E-4C8F-9BF9-114783B539C0}" type="datetimeFigureOut">
+              <a:rPr lang="en-US" smtClean="0"/>
+              <a:t>2/1/2014</a:t>
+            </a:fld>
+            <a:endParaRPr lang="en-US"/>
+          </a:p>
+        </p:txBody>
+      </p:sp>
+      <p:sp>
+        <p:nvSpPr>
+          <p:cNvPr id="4" name="Footer Placeholder 3"/>
+          <p:cNvSpPr>
+            <a:spLocks noGrp="1"/>
+          </p:cNvSpPr>
+          <p:nvPr>
+            <p:ph type="ftr" sz="quarter" idx="2"/>
+          </p:nvPr>
+        </p:nvSpPr>
+        <p:spPr>
+          <a:xfrm>
+            <a:off x="0" y="8685213"/>
+            <a:ext cx="2971800" cy="457200"/>
+          </a:xfrm>
+          <a:prstGeom prst="rect">
+            <a:avLst/>
+          </a:prstGeom>
+        </p:spPr>
+        <p:txBody>
+          <a:bodyPr vert="horz" lIns="91440" tIns="45720" rIns="91440" bIns="45720" rtlCol="0" anchor="b"/>
+          <a:lstStyle>
+            <a:lvl1pPr algn="l">
+              <a:defRPr sz="1200"/>
+            </a:lvl1pPr>
+          </a:lstStyle>
+          <a:p>
+            <a:endParaRPr lang="en-US"/>
+          </a:p>
+        </p:txBody>
+      </p:sp>
+      <p:sp>
+        <p:nvSpPr>
+          <p:cNvPr id="5" name="Slide Number Placeholder 4"/>
+          <p:cNvSpPr>
+            <a:spLocks noGrp="1"/>
+          </p:cNvSpPr>
+          <p:nvPr>
+            <p:ph type="sldNum" sz="quarter" idx="3"/>
+          </p:nvPr>
+        </p:nvSpPr>
+        <p:spPr>
+          <a:xfrm>
+            <a:off x="3884613" y="8685213"/>
+            <a:ext cx="2971800" cy="457200"/>
+          </a:xfrm>
+          <a:prstGeom prst="rect">
+            <a:avLst/>
+          </a:prstGeom>
+        </p:spPr>
+        <p:txBody>
+          <a:bodyPr vert="horz" lIns="91440" tIns="45720" rIns="91440" bIns="45720" rtlCol="0" anchor="b"/>
+          <a:lstStyle>
+            <a:lvl1pPr algn="r">
+              <a:defRPr sz="1200"/>
+            </a:lvl1pPr>
+          </a:lstStyle>
+          <a:p>
+            <a:fld id="{E27F7B36-3726-42B6-8CA1-362DD0E1C5D7}" type="slidenum">
+              <a:rPr lang="en-US" smtClean="0"/>
+              <a:t>‹#›</a:t>
+            </a:fld>
+            <a:endParaRPr lang="en-US"/>
+          </a:p>
+        </p:txBody>
+      </p:sp>
+    </p:spTree>
+    <p:extLst>
+      <p:ext uri="{BB962C8B-B14F-4D97-AF65-F5344CB8AC3E}">
+        <p14:creationId xmlns:p14="http://schemas.microsoft.com/office/powerpoint/2010/main" val="1940914304"/>
+      </p:ext>
+    </p:extLst>
+  </p:cSld>
+  <p:clrMap bg1="lt1" tx1="dk1" bg2="lt2" tx2="dk2" accent1="accent1" accent2="accent2" accent3="accent3" accent4="accent4" accent5="accent5" accent6="accent6" hlink="hlink" folHlink="folHlink"/>
+</p:handoutMaster>
+</file>
+
 <file path=ppt/slideLayouts/slideLayout1.xml><?xml version="1.0" encoding="utf-8"?>
 <p:sldLayout xmlns:a="http://schemas.openxmlformats.org/drawingml/2006/main" xmlns:r="http://schemas.openxmlformats.org/officeDocument/2006/relationships" xmlns:p="http://schemas.openxmlformats.org/presentationml/2006/main" type="title" preserve="1">
   <p:cSld name="Title Slide">
@@ -332,7 +500,7 @@
           <a:p>
             <a:fld id="{75343A78-F800-4556-9316-18F9ECBDBBE5}" type="datetimeFigureOut">
               <a:rPr lang="en-US" smtClean="0"/>
-              <a:t>1/25/2014</a:t>
+              <a:t>2/1/2014</a:t>
             </a:fld>
             <a:endParaRPr lang="en-US"/>
           </a:p>
@@ -518,7 +686,7 @@
           <a:p>
             <a:fld id="{75343A78-F800-4556-9316-18F9ECBDBBE5}" type="datetimeFigureOut">
               <a:rPr lang="en-US" smtClean="0"/>
-              <a:t>1/25/2014</a:t>
+              <a:t>2/1/2014</a:t>
             </a:fld>
             <a:endParaRPr lang="en-US"/>
           </a:p>
@@ -700,7 +868,7 @@
           <a:p>
             <a:fld id="{75343A78-F800-4556-9316-18F9ECBDBBE5}" type="datetimeFigureOut">
               <a:rPr lang="en-US" smtClean="0"/>
-              <a:t>1/25/2014</a:t>
+              <a:t>2/1/2014</a:t>
             </a:fld>
             <a:endParaRPr lang="en-US"/>
           </a:p>
@@ -918,7 +1086,7 @@
           <a:p>
             <a:fld id="{75343A78-F800-4556-9316-18F9ECBDBBE5}" type="datetimeFigureOut">
               <a:rPr lang="en-US" smtClean="0"/>
-              <a:t>1/25/2014</a:t>
+              <a:t>2/1/2014</a:t>
             </a:fld>
             <a:endParaRPr lang="en-US"/>
           </a:p>
@@ -1044,7 +1212,7 @@
           <a:p>
             <a:fld id="{75343A78-F800-4556-9316-18F9ECBDBBE5}" type="datetimeFigureOut">
               <a:rPr lang="en-US" smtClean="0"/>
-              <a:t>1/25/2014</a:t>
+              <a:t>2/1/2014</a:t>
             </a:fld>
             <a:endParaRPr lang="en-US"/>
           </a:p>
@@ -1433,7 +1601,7 @@
           <a:p>
             <a:fld id="{75343A78-F800-4556-9316-18F9ECBDBBE5}" type="datetimeFigureOut">
               <a:rPr lang="en-US" smtClean="0"/>
-              <a:t>1/25/2014</a:t>
+              <a:t>2/1/2014</a:t>
             </a:fld>
             <a:endParaRPr lang="en-US"/>
           </a:p>
@@ -1878,7 +2046,7 @@
           <a:p>
             <a:fld id="{75343A78-F800-4556-9316-18F9ECBDBBE5}" type="datetimeFigureOut">
               <a:rPr lang="en-US" smtClean="0"/>
-              <a:t>1/25/2014</a:t>
+              <a:t>2/1/2014</a:t>
             </a:fld>
             <a:endParaRPr lang="en-US"/>
           </a:p>
@@ -2003,7 +2171,7 @@
           <a:p>
             <a:fld id="{75343A78-F800-4556-9316-18F9ECBDBBE5}" type="datetimeFigureOut">
               <a:rPr lang="en-US" smtClean="0"/>
-              <a:t>1/25/2014</a:t>
+              <a:t>2/1/2014</a:t>
             </a:fld>
             <a:endParaRPr lang="en-US" dirty="0"/>
           </a:p>
@@ -2100,7 +2268,7 @@
           <a:p>
             <a:fld id="{75343A78-F800-4556-9316-18F9ECBDBBE5}" type="datetimeFigureOut">
               <a:rPr lang="en-US" smtClean="0"/>
-              <a:t>1/25/2014</a:t>
+              <a:t>2/1/2014</a:t>
             </a:fld>
             <a:endParaRPr lang="en-US"/>
           </a:p>
@@ -2391,7 +2559,7 @@
           <a:p>
             <a:fld id="{75343A78-F800-4556-9316-18F9ECBDBBE5}" type="datetimeFigureOut">
               <a:rPr lang="en-US" smtClean="0"/>
-              <a:t>1/25/2014</a:t>
+              <a:t>2/1/2014</a:t>
             </a:fld>
             <a:endParaRPr lang="en-US"/>
           </a:p>
@@ -2660,7 +2828,7 @@
           <a:p>
             <a:fld id="{75343A78-F800-4556-9316-18F9ECBDBBE5}" type="datetimeFigureOut">
               <a:rPr lang="en-US" smtClean="0"/>
-              <a:t>1/25/2014</a:t>
+              <a:t>2/1/2014</a:t>
             </a:fld>
             <a:endParaRPr lang="en-US"/>
           </a:p>
@@ -2942,7 +3110,7 @@
           <a:p>
             <a:fld id="{75343A78-F800-4556-9316-18F9ECBDBBE5}" type="datetimeFigureOut">
               <a:rPr lang="en-US" smtClean="0"/>
-              <a:t>1/25/2014</a:t>
+              <a:t>2/1/2014</a:t>
             </a:fld>
             <a:endParaRPr lang="en-US"/>
           </a:p>
@@ -5004,8 +5172,8 @@
           <a:chExt cx="0" cy="0"/>
         </a:xfrm>
       </p:grpSpPr>
-      <mc:AlternateContent xmlns:mc="http://schemas.openxmlformats.org/markup-compatibility/2006">
-        <mc:Choice xmlns:a14="http://schemas.microsoft.com/office/drawing/2010/main" Requires="a14">
+      <mc:AlternateContent xmlns:mc="http://schemas.openxmlformats.org/markup-compatibility/2006" xmlns:a14="http://schemas.microsoft.com/office/drawing/2010/main">
+        <mc:Choice Requires="a14">
           <p:sp>
             <p:nvSpPr>
               <p:cNvPr id="2" name="Content Placeholder 1"/>
@@ -5073,24 +5241,32 @@
                       <m:sSub>
                         <m:sSubPr>
                           <m:ctrlPr>
-                            <a:rPr lang="en-US" i="1"/>
+                            <a:rPr lang="en-US" i="1">
+                              <a:latin typeface="Cambria Math"/>
+                            </a:rPr>
                           </m:ctrlPr>
                         </m:sSubPr>
                         <m:e>
                           <m:r>
-                            <a:rPr lang="en-US" i="1"/>
+                            <a:rPr lang="en-US" i="1">
+                              <a:latin typeface="Cambria Math"/>
+                            </a:rPr>
                             <m:t>𝐵</m:t>
                           </m:r>
                         </m:e>
                         <m:sub>
                           <m:r>
-                            <a:rPr lang="en-US" i="1"/>
+                            <a:rPr lang="en-US" i="1">
+                              <a:latin typeface="Cambria Math"/>
+                            </a:rPr>
                             <m:t>𝑜𝑢𝑡</m:t>
                           </m:r>
                         </m:sub>
                       </m:sSub>
                       <m:r>
-                        <a:rPr lang="en-US" i="1"/>
+                        <a:rPr lang="en-US" i="1">
+                          <a:latin typeface="Cambria Math"/>
+                        </a:rPr>
                         <m:t>=</m:t>
                       </m:r>
                       <m:sSub>
@@ -5103,7 +5279,9 @@
                         </m:sSubPr>
                         <m:e>
                           <m:r>
-                            <a:rPr lang="en-US" i="1"/>
+                            <a:rPr lang="en-US" i="1">
+                              <a:latin typeface="Cambria Math"/>
+                            </a:rPr>
                             <m:t>𝐵</m:t>
                           </m:r>
                         </m:e>
@@ -5117,13 +5295,17 @@
                         </m:sub>
                       </m:sSub>
                       <m:r>
-                        <a:rPr lang="en-US" i="1"/>
+                        <a:rPr lang="en-US" i="1">
+                          <a:latin typeface="Cambria Math"/>
+                        </a:rPr>
                         <m:t>∗</m:t>
                       </m:r>
                       <m:d>
                         <m:dPr>
                           <m:ctrlPr>
-                            <a:rPr lang="en-US" i="1"/>
+                            <a:rPr lang="en-US" i="1">
+                              <a:latin typeface="Cambria Math"/>
+                            </a:rPr>
                           </m:ctrlPr>
                         </m:dPr>
                         <m:e>
@@ -5140,25 +5322,33 @@
                                 <m:fPr>
                                   <m:type m:val="lin"/>
                                   <m:ctrlPr>
-                                    <a:rPr lang="en-US" i="1"/>
+                                    <a:rPr lang="en-US" i="1">
+                                      <a:latin typeface="Cambria Math"/>
+                                    </a:rPr>
                                   </m:ctrlPr>
                                 </m:fPr>
                                 <m:num>
                                   <m:sSub>
                                     <m:sSubPr>
                                       <m:ctrlPr>
-                                        <a:rPr lang="en-US" i="1"/>
+                                        <a:rPr lang="en-US" i="1">
+                                          <a:latin typeface="Cambria Math"/>
+                                        </a:rPr>
                                       </m:ctrlPr>
                                     </m:sSubPr>
                                     <m:e>
                                       <m:r>
-                                        <a:rPr lang="en-US" i="1"/>
+                                        <a:rPr lang="en-US" i="1">
+                                          <a:latin typeface="Cambria Math"/>
+                                        </a:rPr>
                                         <m:t>𝐵𝑖𝑡𝑟𝑎𝑡𝑒</m:t>
                                       </m:r>
                                     </m:e>
                                     <m:sub>
                                       <m:r>
-                                        <a:rPr lang="en-US" i="1"/>
+                                        <a:rPr lang="en-US" i="1">
+                                          <a:latin typeface="Cambria Math"/>
+                                        </a:rPr>
                                         <m:t>𝑜𝑢𝑡</m:t>
                                       </m:r>
                                     </m:sub>
@@ -5166,7 +5356,9 @@
                                 </m:num>
                                 <m:den>
                                   <m:r>
-                                    <a:rPr lang="en-US" i="1"/>
+                                    <a:rPr lang="en-US" i="1">
+                                      <a:latin typeface="Cambria Math"/>
+                                    </a:rPr>
                                     <m:t>𝐵𝑖𝑡𝑟𝑎𝑡𝑒</m:t>
                                   </m:r>
                                 </m:den>
@@ -5208,18 +5400,24 @@
                       <m:sSub>
                         <m:sSubPr>
                           <m:ctrlPr>
-                            <a:rPr lang="en-US" i="1"/>
+                            <a:rPr lang="en-US" i="1">
+                              <a:latin typeface="Cambria Math"/>
+                            </a:rPr>
                           </m:ctrlPr>
                         </m:sSubPr>
                         <m:e>
                           <m:r>
-                            <a:rPr lang="en-US" i="1"/>
+                            <a:rPr lang="en-US" i="1">
+                              <a:latin typeface="Cambria Math"/>
+                            </a:rPr>
                             <m:t>𝐵</m:t>
                           </m:r>
                         </m:e>
                         <m:sub>
                           <m:r>
-                            <a:rPr lang="en-US" i="1"/>
+                            <a:rPr lang="en-US" i="1">
+                              <a:latin typeface="Cambria Math"/>
+                            </a:rPr>
                             <m:t>𝑜𝑢𝑡</m:t>
                           </m:r>
                         </m:sub>
@@ -5241,7 +5439,9 @@
                         </m:sSubPr>
                         <m:e>
                           <m:r>
-                            <a:rPr lang="en-US" i="1" smtClean="0"/>
+                            <a:rPr lang="en-US" i="1" smtClean="0">
+                              <a:latin typeface="Cambria Math"/>
+                            </a:rPr>
                             <m:t>𝐵</m:t>
                           </m:r>
                         </m:e>
@@ -5255,13 +5455,17 @@
                         </m:sub>
                       </m:sSub>
                       <m:r>
-                        <a:rPr lang="en-US" i="1"/>
+                        <a:rPr lang="en-US" i="1">
+                          <a:latin typeface="Cambria Math"/>
+                        </a:rPr>
                         <m:t>∗</m:t>
                       </m:r>
                       <m:d>
                         <m:dPr>
                           <m:ctrlPr>
-                            <a:rPr lang="en-US" i="1"/>
+                            <a:rPr lang="en-US" i="1">
+                              <a:latin typeface="Cambria Math"/>
+                            </a:rPr>
                           </m:ctrlPr>
                         </m:dPr>
                         <m:e>
@@ -5339,7 +5543,7 @@
             </p:txBody>
           </p:sp>
         </mc:Choice>
-        <mc:Fallback>
+        <mc:Fallback xmlns="">
           <p:sp>
             <p:nvSpPr>
               <p:cNvPr id="2" name="Content Placeholder 1"/>
@@ -5406,6 +5610,13 @@
   <p:clrMapOvr>
     <a:masterClrMapping/>
   </p:clrMapOvr>
+  <p:timing>
+    <p:tnLst>
+      <p:par>
+        <p:cTn id="1" dur="indefinite" restart="never" nodeType="tmRoot"/>
+      </p:par>
+    </p:tnLst>
+  </p:timing>
 </p:sld>
 </file>
 
@@ -5787,4 +5998,289 @@
   <a:objectDefaults/>
   <a:extraClrSchemeLst/>
 </a:theme>
+</file>
+
+<file path=ppt/theme/theme2.xml><?xml version="1.0" encoding="utf-8"?>
+<a:theme xmlns:a="http://schemas.openxmlformats.org/drawingml/2006/main" name="Office Theme">
+  <a:themeElements>
+    <a:clrScheme name="Office">
+      <a:dk1>
+        <a:sysClr val="windowText" lastClr="000000"/>
+      </a:dk1>
+      <a:lt1>
+        <a:sysClr val="window" lastClr="FFFFFF"/>
+      </a:lt1>
+      <a:dk2>
+        <a:srgbClr val="1F497D"/>
+      </a:dk2>
+      <a:lt2>
+        <a:srgbClr val="EEECE1"/>
+      </a:lt2>
+      <a:accent1>
+        <a:srgbClr val="4F81BD"/>
+      </a:accent1>
+      <a:accent2>
+        <a:srgbClr val="C0504D"/>
+      </a:accent2>
+      <a:accent3>
+        <a:srgbClr val="9BBB59"/>
+      </a:accent3>
+      <a:accent4>
+        <a:srgbClr val="8064A2"/>
+      </a:accent4>
+      <a:accent5>
+        <a:srgbClr val="4BACC6"/>
+      </a:accent5>
+      <a:accent6>
+        <a:srgbClr val="F79646"/>
+      </a:accent6>
+      <a:hlink>
+        <a:srgbClr val="0000FF"/>
+      </a:hlink>
+      <a:folHlink>
+        <a:srgbClr val="800080"/>
+      </a:folHlink>
+    </a:clrScheme>
+    <a:fontScheme name="Office">
+      <a:majorFont>
+        <a:latin typeface="Calibri"/>
+        <a:ea typeface=""/>
+        <a:cs typeface=""/>
+        <a:font script="Jpan" typeface="ＭＳ Ｐゴシック"/>
+        <a:font script="Hang" typeface="맑은 고딕"/>
+        <a:font script="Hans" typeface="宋体"/>
+        <a:font script="Hant" typeface="新細明體"/>
+        <a:font script="Arab" typeface="Times New Roman"/>
+        <a:font script="Hebr" typeface="Times New Roman"/>
+        <a:font script="Thai" typeface="Angsana New"/>
+        <a:font script="Ethi" typeface="Nyala"/>
+        <a:font script="Beng" typeface="Vrinda"/>
+        <a:font script="Gujr" typeface="Shruti"/>
+        <a:font script="Khmr" typeface="MoolBoran"/>
+        <a:font script="Knda" typeface="Tunga"/>
+        <a:font script="Guru" typeface="Raavi"/>
+        <a:font script="Cans" typeface="Euphemia"/>
+        <a:font script="Cher" typeface="Plantagenet Cherokee"/>
+        <a:font script="Yiii" typeface="Microsoft Yi Baiti"/>
+        <a:font script="Tibt" typeface="Microsoft Himalaya"/>
+        <a:font script="Thaa" typeface="MV Boli"/>
+        <a:font script="Deva" typeface="Mangal"/>
+        <a:font script="Telu" typeface="Gautami"/>
+        <a:font script="Taml" typeface="Latha"/>
+        <a:font script="Syrc" typeface="Estrangelo Edessa"/>
+        <a:font script="Orya" typeface="Kalinga"/>
+        <a:font script="Mlym" typeface="Kartika"/>
+        <a:font script="Laoo" typeface="DokChampa"/>
+        <a:font script="Sinh" typeface="Iskoola Pota"/>
+        <a:font script="Mong" typeface="Mongolian Baiti"/>
+        <a:font script="Viet" typeface="Times New Roman"/>
+        <a:font script="Uigh" typeface="Microsoft Uighur"/>
+        <a:font script="Geor" typeface="Sylfaen"/>
+      </a:majorFont>
+      <a:minorFont>
+        <a:latin typeface="Calibri"/>
+        <a:ea typeface=""/>
+        <a:cs typeface=""/>
+        <a:font script="Jpan" typeface="ＭＳ Ｐゴシック"/>
+        <a:font script="Hang" typeface="맑은 고딕"/>
+        <a:font script="Hans" typeface="宋体"/>
+        <a:font script="Hant" typeface="新細明體"/>
+        <a:font script="Arab" typeface="Arial"/>
+        <a:font script="Hebr" typeface="Arial"/>
+        <a:font script="Thai" typeface="Cordia New"/>
+        <a:font script="Ethi" typeface="Nyala"/>
+        <a:font script="Beng" typeface="Vrinda"/>
+        <a:font script="Gujr" typeface="Shruti"/>
+        <a:font script="Khmr" typeface="DaunPenh"/>
+        <a:font script="Knda" typeface="Tunga"/>
+        <a:font script="Guru" typeface="Raavi"/>
+        <a:font script="Cans" typeface="Euphemia"/>
+        <a:font script="Cher" typeface="Plantagenet Cherokee"/>
+        <a:font script="Yiii" typeface="Microsoft Yi Baiti"/>
+        <a:font script="Tibt" typeface="Microsoft Himalaya"/>
+        <a:font script="Thaa" typeface="MV Boli"/>
+        <a:font script="Deva" typeface="Mangal"/>
+        <a:font script="Telu" typeface="Gautami"/>
+        <a:font script="Taml" typeface="Latha"/>
+        <a:font script="Syrc" typeface="Estrangelo Edessa"/>
+        <a:font script="Orya" typeface="Kalinga"/>
+        <a:font script="Mlym" typeface="Kartika"/>
+        <a:font script="Laoo" typeface="DokChampa"/>
+        <a:font script="Sinh" typeface="Iskoola Pota"/>
+        <a:font script="Mong" typeface="Mongolian Baiti"/>
+        <a:font script="Viet" typeface="Arial"/>
+        <a:font script="Uigh" typeface="Microsoft Uighur"/>
+        <a:font script="Geor" typeface="Sylfaen"/>
+      </a:minorFont>
+    </a:fontScheme>
+    <a:fmtScheme name="Office">
+      <a:fillStyleLst>
+        <a:solidFill>
+          <a:schemeClr val="phClr"/>
+        </a:solidFill>
+        <a:gradFill rotWithShape="1">
+          <a:gsLst>
+            <a:gs pos="0">
+              <a:schemeClr val="phClr">
+                <a:tint val="50000"/>
+                <a:satMod val="300000"/>
+              </a:schemeClr>
+            </a:gs>
+            <a:gs pos="35000">
+              <a:schemeClr val="phClr">
+                <a:tint val="37000"/>
+                <a:satMod val="300000"/>
+              </a:schemeClr>
+            </a:gs>
+            <a:gs pos="100000">
+              <a:schemeClr val="phClr">
+                <a:tint val="15000"/>
+                <a:satMod val="350000"/>
+              </a:schemeClr>
+            </a:gs>
+          </a:gsLst>
+          <a:lin ang="16200000" scaled="1"/>
+        </a:gradFill>
+        <a:gradFill rotWithShape="1">
+          <a:gsLst>
+            <a:gs pos="0">
+              <a:schemeClr val="phClr">
+                <a:shade val="51000"/>
+                <a:satMod val="130000"/>
+              </a:schemeClr>
+            </a:gs>
+            <a:gs pos="80000">
+              <a:schemeClr val="phClr">
+                <a:shade val="93000"/>
+                <a:satMod val="130000"/>
+              </a:schemeClr>
+            </a:gs>
+            <a:gs pos="100000">
+              <a:schemeClr val="phClr">
+                <a:shade val="94000"/>
+                <a:satMod val="135000"/>
+              </a:schemeClr>
+            </a:gs>
+          </a:gsLst>
+          <a:lin ang="16200000" scaled="0"/>
+        </a:gradFill>
+      </a:fillStyleLst>
+      <a:lnStyleLst>
+        <a:ln w="9525" cap="flat" cmpd="sng" algn="ctr">
+          <a:solidFill>
+            <a:schemeClr val="phClr">
+              <a:shade val="95000"/>
+              <a:satMod val="105000"/>
+            </a:schemeClr>
+          </a:solidFill>
+          <a:prstDash val="solid"/>
+        </a:ln>
+        <a:ln w="25400" cap="flat" cmpd="sng" algn="ctr">
+          <a:solidFill>
+            <a:schemeClr val="phClr"/>
+          </a:solidFill>
+          <a:prstDash val="solid"/>
+        </a:ln>
+        <a:ln w="38100" cap="flat" cmpd="sng" algn="ctr">
+          <a:solidFill>
+            <a:schemeClr val="phClr"/>
+          </a:solidFill>
+          <a:prstDash val="solid"/>
+        </a:ln>
+      </a:lnStyleLst>
+      <a:effectStyleLst>
+        <a:effectStyle>
+          <a:effectLst>
+            <a:outerShdw blurRad="40000" dist="20000" dir="5400000" rotWithShape="0">
+              <a:srgbClr val="000000">
+                <a:alpha val="38000"/>
+              </a:srgbClr>
+            </a:outerShdw>
+          </a:effectLst>
+        </a:effectStyle>
+        <a:effectStyle>
+          <a:effectLst>
+            <a:outerShdw blurRad="40000" dist="23000" dir="5400000" rotWithShape="0">
+              <a:srgbClr val="000000">
+                <a:alpha val="35000"/>
+              </a:srgbClr>
+            </a:outerShdw>
+          </a:effectLst>
+        </a:effectStyle>
+        <a:effectStyle>
+          <a:effectLst>
+            <a:outerShdw blurRad="40000" dist="23000" dir="5400000" rotWithShape="0">
+              <a:srgbClr val="000000">
+                <a:alpha val="35000"/>
+              </a:srgbClr>
+            </a:outerShdw>
+          </a:effectLst>
+          <a:scene3d>
+            <a:camera prst="orthographicFront">
+              <a:rot lat="0" lon="0" rev="0"/>
+            </a:camera>
+            <a:lightRig rig="threePt" dir="t">
+              <a:rot lat="0" lon="0" rev="1200000"/>
+            </a:lightRig>
+          </a:scene3d>
+          <a:sp3d>
+            <a:bevelT w="63500" h="25400"/>
+          </a:sp3d>
+        </a:effectStyle>
+      </a:effectStyleLst>
+      <a:bgFillStyleLst>
+        <a:solidFill>
+          <a:schemeClr val="phClr"/>
+        </a:solidFill>
+        <a:gradFill rotWithShape="1">
+          <a:gsLst>
+            <a:gs pos="0">
+              <a:schemeClr val="phClr">
+                <a:tint val="40000"/>
+                <a:satMod val="350000"/>
+              </a:schemeClr>
+            </a:gs>
+            <a:gs pos="40000">
+              <a:schemeClr val="phClr">
+                <a:tint val="45000"/>
+                <a:shade val="99000"/>
+                <a:satMod val="350000"/>
+              </a:schemeClr>
+            </a:gs>
+            <a:gs pos="100000">
+              <a:schemeClr val="phClr">
+                <a:shade val="20000"/>
+                <a:satMod val="255000"/>
+              </a:schemeClr>
+            </a:gs>
+          </a:gsLst>
+          <a:path path="circle">
+            <a:fillToRect l="50000" t="-80000" r="50000" b="180000"/>
+          </a:path>
+        </a:gradFill>
+        <a:gradFill rotWithShape="1">
+          <a:gsLst>
+            <a:gs pos="0">
+              <a:schemeClr val="phClr">
+                <a:tint val="80000"/>
+                <a:satMod val="300000"/>
+              </a:schemeClr>
+            </a:gs>
+            <a:gs pos="100000">
+              <a:schemeClr val="phClr">
+                <a:shade val="30000"/>
+                <a:satMod val="200000"/>
+              </a:schemeClr>
+            </a:gs>
+          </a:gsLst>
+          <a:path path="circle">
+            <a:fillToRect l="50000" t="50000" r="50000" b="50000"/>
+          </a:path>
+        </a:gradFill>
+      </a:bgFillStyleLst>
+    </a:fmtScheme>
+  </a:themeElements>
+  <a:objectDefaults/>
+  <a:extraClrSchemeLst/>
+</a:theme>
 </file>
</xml_diff>